<commit_message>
adding 1 Uvod.pptx to main branch
</commit_message>
<xml_diff>
--- a/01_Uvod.pptx
+++ b/01_Uvod.pptx
@@ -301,7 +301,7 @@
           <a:p>
             <a:fld id="{1D8BD707-D9CF-40AE-B4C6-C98DA3205C09}" type="datetimeFigureOut">
               <a:rPr lang="en-US"/>
-              <a:t>4/3/2023</a:t>
+              <a:t>3/28/2024</a:t>
             </a:fld>
             <a:endParaRPr lang="en-US"/>
           </a:p>
@@ -478,7 +478,7 @@
           <a:p>
             <a:fld id="{1D8BD707-D9CF-40AE-B4C6-C98DA3205C09}" type="datetimeFigureOut">
               <a:rPr lang="en-US"/>
-              <a:t>4/3/2023</a:t>
+              <a:t>3/28/2024</a:t>
             </a:fld>
             <a:endParaRPr lang="en-US"/>
           </a:p>
@@ -692,7 +692,7 @@
           <a:p>
             <a:fld id="{1D8BD707-D9CF-40AE-B4C6-C98DA3205C09}" type="datetimeFigureOut">
               <a:rPr lang="en-US"/>
-              <a:t>4/3/2023</a:t>
+              <a:t>3/28/2024</a:t>
             </a:fld>
             <a:endParaRPr lang="en-US"/>
           </a:p>
@@ -840,7 +840,7 @@
           <a:p>
             <a:fld id="{1D8BD707-D9CF-40AE-B4C6-C98DA3205C09}" type="datetimeFigureOut">
               <a:rPr lang="en-US"/>
-              <a:t>4/3/2023</a:t>
+              <a:t>3/28/2024</a:t>
             </a:fld>
             <a:endParaRPr lang="en-US"/>
           </a:p>
@@ -959,7 +959,7 @@
           <a:p>
             <a:fld id="{1D8BD707-D9CF-40AE-B4C6-C98DA3205C09}" type="datetimeFigureOut">
               <a:rPr lang="en-US"/>
-              <a:t>4/3/2023</a:t>
+              <a:t>3/28/2024</a:t>
             </a:fld>
             <a:endParaRPr lang="en-US"/>
           </a:p>
@@ -1213,7 +1213,7 @@
           <a:p>
             <a:fld id="{1D8BD707-D9CF-40AE-B4C6-C98DA3205C09}" type="datetimeFigureOut">
               <a:rPr lang="en-US"/>
-              <a:t>4/3/2023</a:t>
+              <a:t>3/28/2024</a:t>
             </a:fld>
             <a:endParaRPr lang="en-US"/>
           </a:p>
@@ -1478,8 +1478,8 @@
           <a:p>
             <a:pPr algn="ctr"/>
             <a:r>
-              <a:rPr lang="sr-Latn-RS" dirty="0" smtClean="0"/>
-              <a:t>UVOD</a:t>
+              <a:rPr lang="sr-Latn-RS" smtClean="0"/>
+              <a:t>UVOD- 2024</a:t>
             </a:r>
             <a:endParaRPr lang="sr-Latn-RS" dirty="0"/>
           </a:p>

</xml_diff>